<commit_message>
Update on Module 5
</commit_message>
<xml_diff>
--- a/Slides/Module 5 - JS Libraries.pptx
+++ b/Slides/Module 5 - JS Libraries.pptx
@@ -6,10 +6,10 @@
     <p:sldMasterId id="2147483679" r:id="rId5"/>
   </p:sldMasterIdLst>
   <p:notesMasterIdLst>
-    <p:notesMasterId r:id="rId20"/>
+    <p:notesMasterId r:id="rId26"/>
   </p:notesMasterIdLst>
   <p:handoutMasterIdLst>
-    <p:handoutMasterId r:id="rId21"/>
+    <p:handoutMasterId r:id="rId27"/>
   </p:handoutMasterIdLst>
   <p:sldIdLst>
     <p:sldId id="271" r:id="rId6"/>
@@ -24,8 +24,14 @@
     <p:sldId id="337" r:id="rId15"/>
     <p:sldId id="338" r:id="rId16"/>
     <p:sldId id="285" r:id="rId17"/>
-    <p:sldId id="286" r:id="rId18"/>
-    <p:sldId id="269" r:id="rId19"/>
+    <p:sldId id="339" r:id="rId18"/>
+    <p:sldId id="340" r:id="rId19"/>
+    <p:sldId id="342" r:id="rId20"/>
+    <p:sldId id="341" r:id="rId21"/>
+    <p:sldId id="343" r:id="rId22"/>
+    <p:sldId id="344" r:id="rId23"/>
+    <p:sldId id="286" r:id="rId24"/>
+    <p:sldId id="269" r:id="rId25"/>
   </p:sldIdLst>
   <p:sldSz cx="12192000" cy="6858000"/>
   <p:notesSz cx="6858000" cy="9144000"/>
@@ -135,11 +141,11 @@
         <p14:section name="Module" id="{F752BF7D-B949-49F5-BAD3-8E9C680033BA}">
           <p14:sldIdLst>
             <p14:sldId id="274"/>
+            <p14:sldId id="278"/>
           </p14:sldIdLst>
         </p14:section>
-        <p14:section name="Introducing Modules" id="{86685C7F-16EF-46FD-B02D-AFD6166D30DB}">
+        <p14:section name="jQuery" id="{86685C7F-16EF-46FD-B02D-AFD6166D30DB}">
           <p14:sldIdLst>
-            <p14:sldId id="278"/>
             <p14:sldId id="277"/>
             <p14:sldId id="322"/>
             <p14:sldId id="323"/>
@@ -150,9 +156,19 @@
             <p14:sldId id="338"/>
           </p14:sldIdLst>
         </p14:section>
-        <p14:section name="Creating Objects" id="{48582895-8D07-453D-8820-97B9D513CD28}">
+        <p14:section name="RequireJS" id="{48582895-8D07-453D-8820-97B9D513CD28}">
           <p14:sldIdLst>
             <p14:sldId id="285"/>
+            <p14:sldId id="339"/>
+            <p14:sldId id="340"/>
+            <p14:sldId id="342"/>
+            <p14:sldId id="341"/>
+          </p14:sldIdLst>
+        </p14:section>
+        <p14:section name="AngularJS" id="{75F2F62A-518F-4C1E-8659-8613B5F7FFC6}">
+          <p14:sldIdLst>
+            <p14:sldId id="343"/>
+            <p14:sldId id="344"/>
           </p14:sldIdLst>
         </p14:section>
         <p14:section name="Summary" id="{4292E653-E0D1-474E-9B1E-023385F76563}">
@@ -778,6 +794,135 @@
 </p:notes>
 </file>
 
+<file path=ppt/notesSlides/notesSlide10.xml><?xml version="1.0" encoding="utf-8"?>
+<p:notes xmlns:a="http://schemas.openxmlformats.org/drawingml/2006/main" xmlns:r="http://schemas.openxmlformats.org/officeDocument/2006/relationships" xmlns:p="http://schemas.openxmlformats.org/presentationml/2006/main">
+  <p:cSld>
+    <p:spTree>
+      <p:nvGrpSpPr>
+        <p:cNvPr id="1" name=""/>
+        <p:cNvGrpSpPr/>
+        <p:nvPr/>
+      </p:nvGrpSpPr>
+      <p:grpSpPr>
+        <a:xfrm>
+          <a:off x="0" y="0"/>
+          <a:ext cx="0" cy="0"/>
+          <a:chOff x="0" y="0"/>
+          <a:chExt cx="0" cy="0"/>
+        </a:xfrm>
+      </p:grpSpPr>
+      <p:sp>
+        <p:nvSpPr>
+          <p:cNvPr id="2" name="Slide Image Placeholder 1"/>
+          <p:cNvSpPr>
+            <a:spLocks noGrp="1" noRot="1" noChangeAspect="1"/>
+          </p:cNvSpPr>
+          <p:nvPr>
+            <p:ph type="sldImg"/>
+          </p:nvPr>
+        </p:nvSpPr>
+        <p:spPr/>
+      </p:sp>
+      <p:sp>
+        <p:nvSpPr>
+          <p:cNvPr id="3" name="Notes Placeholder 2"/>
+          <p:cNvSpPr>
+            <a:spLocks noGrp="1"/>
+          </p:cNvSpPr>
+          <p:nvPr>
+            <p:ph type="body" idx="1"/>
+          </p:nvPr>
+        </p:nvSpPr>
+        <p:spPr/>
+        <p:txBody>
+          <a:bodyPr>
+            <a:noAutofit/>
+          </a:bodyPr>
+          <a:lstStyle/>
+          <a:p>
+            <a:r>
+              <a:rPr lang="en-GB" dirty="0" smtClean="0">
+                <a:solidFill>
+                  <a:schemeClr val="tx2"/>
+                </a:solidFill>
+                <a:latin typeface="Segoe" pitchFamily="34" charset="0"/>
+              </a:rPr>
+              <a:t>After</a:t>
+            </a:r>
+            <a:r>
+              <a:rPr lang="en-GB" baseline="0" dirty="0" smtClean="0">
+                <a:solidFill>
+                  <a:schemeClr val="tx2"/>
+                </a:solidFill>
+                <a:latin typeface="Segoe" pitchFamily="34" charset="0"/>
+              </a:rPr>
+              <a:t> this slide, it’s all demo. </a:t>
+            </a:r>
+          </a:p>
+          <a:p>
+            <a:endParaRPr lang="en-GB" baseline="0" dirty="0" smtClean="0">
+              <a:solidFill>
+                <a:schemeClr val="tx2"/>
+              </a:solidFill>
+              <a:latin typeface="Segoe" pitchFamily="34" charset="0"/>
+            </a:endParaRPr>
+          </a:p>
+          <a:p>
+            <a:r>
+              <a:rPr lang="en-GB" baseline="0" dirty="0" smtClean="0">
+                <a:solidFill>
+                  <a:schemeClr val="tx2"/>
+                </a:solidFill>
+                <a:latin typeface="Segoe" pitchFamily="34" charset="0"/>
+              </a:rPr>
+              <a:t>See the demo script for the majority of the content</a:t>
+            </a:r>
+            <a:endParaRPr lang="en-GB" dirty="0">
+              <a:solidFill>
+                <a:schemeClr val="tx2"/>
+              </a:solidFill>
+              <a:latin typeface="Segoe" pitchFamily="34" charset="0"/>
+            </a:endParaRPr>
+          </a:p>
+        </p:txBody>
+      </p:sp>
+      <p:sp>
+        <p:nvSpPr>
+          <p:cNvPr id="4" name="Slide Number Placeholder 3"/>
+          <p:cNvSpPr>
+            <a:spLocks noGrp="1"/>
+          </p:cNvSpPr>
+          <p:nvPr>
+            <p:ph type="sldNum" sz="quarter" idx="10"/>
+          </p:nvPr>
+        </p:nvSpPr>
+        <p:spPr/>
+        <p:txBody>
+          <a:bodyPr/>
+          <a:lstStyle/>
+          <a:p>
+            <a:fld id="{13F0F35F-DD44-4607-AEC1-49D7A4BC4066}" type="slidenum">
+              <a:rPr lang="en-US" smtClean="0"/>
+              <a:pPr/>
+              <a:t>19</a:t>
+            </a:fld>
+            <a:endParaRPr lang="en-US" dirty="0"/>
+          </a:p>
+        </p:txBody>
+      </p:sp>
+    </p:spTree>
+    <p:extLst>
+      <p:ext uri="{BB962C8B-B14F-4D97-AF65-F5344CB8AC3E}">
+        <p14:creationId xmlns:p14="http://schemas.microsoft.com/office/powerpoint/2010/main" val="3328470092"/>
+      </p:ext>
+    </p:extLst>
+  </p:cSld>
+  <p:clrMapOvr>
+    <a:masterClrMapping/>
+  </p:clrMapOvr>
+</p:notes>
+</file>
+
 <file path=ppt/notesSlides/notesSlide2.xml><?xml version="1.0" encoding="utf-8"?>
 <p:notes xmlns:a="http://schemas.openxmlformats.org/drawingml/2006/main" xmlns:r="http://schemas.openxmlformats.org/officeDocument/2006/relationships" xmlns:p="http://schemas.openxmlformats.org/presentationml/2006/main">
   <p:cSld>
@@ -1339,54 +1484,27 @@
         </p:nvSpPr>
         <p:spPr/>
         <p:txBody>
-          <a:bodyPr>
-            <a:noAutofit/>
-          </a:bodyPr>
+          <a:bodyPr/>
           <a:lstStyle/>
           <a:p>
             <a:r>
-              <a:rPr lang="en-GB" dirty="0" smtClean="0">
-                <a:solidFill>
-                  <a:schemeClr val="tx2"/>
-                </a:solidFill>
-                <a:latin typeface="Segoe" pitchFamily="34" charset="0"/>
-              </a:rPr>
-              <a:t>After</a:t>
-            </a:r>
-            <a:r>
-              <a:rPr lang="en-GB" baseline="0" dirty="0" smtClean="0">
-                <a:solidFill>
-                  <a:schemeClr val="tx2"/>
-                </a:solidFill>
-                <a:latin typeface="Segoe" pitchFamily="34" charset="0"/>
-              </a:rPr>
-              <a:t> this slide, it’s all demo. </a:t>
-            </a:r>
-          </a:p>
-          <a:p>
-            <a:endParaRPr lang="en-GB" baseline="0" dirty="0" smtClean="0">
-              <a:solidFill>
-                <a:schemeClr val="tx2"/>
-              </a:solidFill>
-              <a:latin typeface="Segoe" pitchFamily="34" charset="0"/>
-            </a:endParaRPr>
-          </a:p>
-          <a:p>
-            <a:r>
-              <a:rPr lang="en-GB" baseline="0" dirty="0" smtClean="0">
-                <a:solidFill>
-                  <a:schemeClr val="tx2"/>
-                </a:solidFill>
-                <a:latin typeface="Segoe" pitchFamily="34" charset="0"/>
-              </a:rPr>
-              <a:t>See the demo script for the majority of the content</a:t>
-            </a:r>
-            <a:endParaRPr lang="en-GB" dirty="0">
-              <a:solidFill>
-                <a:schemeClr val="tx2"/>
-              </a:solidFill>
-              <a:latin typeface="Segoe" pitchFamily="34" charset="0"/>
-            </a:endParaRPr>
+              <a:rPr lang="en-US" dirty="0" smtClean="0"/>
+              <a:t>Modules are to</a:t>
+            </a:r>
+            <a:r>
+              <a:rPr lang="en-US" baseline="0" dirty="0" smtClean="0"/>
+              <a:t> JS as classes are to Java, C++, C#</a:t>
+            </a:r>
+          </a:p>
+          <a:p>
+            <a:endParaRPr lang="en-US" baseline="0" dirty="0" smtClean="0"/>
+          </a:p>
+          <a:p>
+            <a:r>
+              <a:rPr lang="en-US" baseline="0" dirty="0" smtClean="0"/>
+              <a:t>Just like Java packages, JS organizes their modules into a hierarchy under one namespace. However JS packages do not enforce access privileges</a:t>
+            </a:r>
+            <a:endParaRPr lang="en-US" dirty="0"/>
           </a:p>
         </p:txBody>
       </p:sp>
@@ -1405,19 +1523,243 @@
           <a:bodyPr/>
           <a:lstStyle/>
           <a:p>
-            <a:fld id="{13F0F35F-DD44-4607-AEC1-49D7A4BC4066}" type="slidenum">
+            <a:fld id="{4CFD207A-07DF-40AD-A916-9872E089CE7A}" type="slidenum">
               <a:rPr lang="en-US" smtClean="0"/>
-              <a:pPr/>
               <a:t>13</a:t>
             </a:fld>
-            <a:endParaRPr lang="en-US" dirty="0"/>
+            <a:endParaRPr lang="en-US"/>
           </a:p>
         </p:txBody>
       </p:sp>
     </p:spTree>
     <p:extLst>
       <p:ext uri="{BB962C8B-B14F-4D97-AF65-F5344CB8AC3E}">
-        <p14:creationId xmlns:p14="http://schemas.microsoft.com/office/powerpoint/2010/main" val="3328470092"/>
+        <p14:creationId xmlns:p14="http://schemas.microsoft.com/office/powerpoint/2010/main" val="2750159162"/>
+      </p:ext>
+    </p:extLst>
+  </p:cSld>
+  <p:clrMapOvr>
+    <a:masterClrMapping/>
+  </p:clrMapOvr>
+</p:notes>
+</file>
+
+<file path=ppt/notesSlides/notesSlide8.xml><?xml version="1.0" encoding="utf-8"?>
+<p:notes xmlns:a="http://schemas.openxmlformats.org/drawingml/2006/main" xmlns:r="http://schemas.openxmlformats.org/officeDocument/2006/relationships" xmlns:p="http://schemas.openxmlformats.org/presentationml/2006/main">
+  <p:cSld>
+    <p:spTree>
+      <p:nvGrpSpPr>
+        <p:cNvPr id="1" name=""/>
+        <p:cNvGrpSpPr/>
+        <p:nvPr/>
+      </p:nvGrpSpPr>
+      <p:grpSpPr>
+        <a:xfrm>
+          <a:off x="0" y="0"/>
+          <a:ext cx="0" cy="0"/>
+          <a:chOff x="0" y="0"/>
+          <a:chExt cx="0" cy="0"/>
+        </a:xfrm>
+      </p:grpSpPr>
+      <p:sp>
+        <p:nvSpPr>
+          <p:cNvPr id="2" name="Slide Image Placeholder 1"/>
+          <p:cNvSpPr>
+            <a:spLocks noGrp="1" noRot="1" noChangeAspect="1"/>
+          </p:cNvSpPr>
+          <p:nvPr>
+            <p:ph type="sldImg"/>
+          </p:nvPr>
+        </p:nvSpPr>
+        <p:spPr/>
+      </p:sp>
+      <p:sp>
+        <p:nvSpPr>
+          <p:cNvPr id="3" name="Notes Placeholder 2"/>
+          <p:cNvSpPr>
+            <a:spLocks noGrp="1"/>
+          </p:cNvSpPr>
+          <p:nvPr>
+            <p:ph type="body" idx="1"/>
+          </p:nvPr>
+        </p:nvSpPr>
+        <p:spPr/>
+        <p:txBody>
+          <a:bodyPr/>
+          <a:lstStyle/>
+          <a:p>
+            <a:r>
+              <a:rPr lang="en-US" dirty="0" smtClean="0"/>
+              <a:t>We have already discussed jQuery and</a:t>
+            </a:r>
+            <a:r>
+              <a:rPr lang="en-US" baseline="0" dirty="0" smtClean="0"/>
+              <a:t> briefly discussed Node but Dojo is a new topic</a:t>
+            </a:r>
+          </a:p>
+          <a:p>
+            <a:endParaRPr lang="en-US" baseline="0" dirty="0" smtClean="0"/>
+          </a:p>
+          <a:p>
+            <a:r>
+              <a:rPr lang="en-US" baseline="0" dirty="0" err="1" smtClean="0"/>
+              <a:t>Quickly,Dojo</a:t>
+            </a:r>
+            <a:r>
+              <a:rPr lang="en-US" baseline="0" dirty="0" smtClean="0"/>
+              <a:t> is a JS toolkit that is used to create Web Apps. Dojo supplies widgets, utilities and IO abstraction services</a:t>
+            </a:r>
+          </a:p>
+          <a:p>
+            <a:endParaRPr lang="en-US" baseline="0" dirty="0" smtClean="0"/>
+          </a:p>
+        </p:txBody>
+      </p:sp>
+      <p:sp>
+        <p:nvSpPr>
+          <p:cNvPr id="4" name="Slide Number Placeholder 3"/>
+          <p:cNvSpPr>
+            <a:spLocks noGrp="1"/>
+          </p:cNvSpPr>
+          <p:nvPr>
+            <p:ph type="sldNum" sz="quarter" idx="10"/>
+          </p:nvPr>
+        </p:nvSpPr>
+        <p:spPr/>
+        <p:txBody>
+          <a:bodyPr/>
+          <a:lstStyle/>
+          <a:p>
+            <a:fld id="{4CFD207A-07DF-40AD-A916-9872E089CE7A}" type="slidenum">
+              <a:rPr lang="en-US" smtClean="0"/>
+              <a:t>14</a:t>
+            </a:fld>
+            <a:endParaRPr lang="en-US"/>
+          </a:p>
+        </p:txBody>
+      </p:sp>
+    </p:spTree>
+    <p:extLst>
+      <p:ext uri="{BB962C8B-B14F-4D97-AF65-F5344CB8AC3E}">
+        <p14:creationId xmlns:p14="http://schemas.microsoft.com/office/powerpoint/2010/main" val="3770723402"/>
+      </p:ext>
+    </p:extLst>
+  </p:cSld>
+  <p:clrMapOvr>
+    <a:masterClrMapping/>
+  </p:clrMapOvr>
+</p:notes>
+</file>
+
+<file path=ppt/notesSlides/notesSlide9.xml><?xml version="1.0" encoding="utf-8"?>
+<p:notes xmlns:a="http://schemas.openxmlformats.org/drawingml/2006/main" xmlns:r="http://schemas.openxmlformats.org/officeDocument/2006/relationships" xmlns:p="http://schemas.openxmlformats.org/presentationml/2006/main">
+  <p:cSld>
+    <p:spTree>
+      <p:nvGrpSpPr>
+        <p:cNvPr id="1" name=""/>
+        <p:cNvGrpSpPr/>
+        <p:nvPr/>
+      </p:nvGrpSpPr>
+      <p:grpSpPr>
+        <a:xfrm>
+          <a:off x="0" y="0"/>
+          <a:ext cx="0" cy="0"/>
+          <a:chOff x="0" y="0"/>
+          <a:chExt cx="0" cy="0"/>
+        </a:xfrm>
+      </p:grpSpPr>
+      <p:sp>
+        <p:nvSpPr>
+          <p:cNvPr id="2" name="Slide Image Placeholder 1"/>
+          <p:cNvSpPr>
+            <a:spLocks noGrp="1" noRot="1" noChangeAspect="1"/>
+          </p:cNvSpPr>
+          <p:nvPr>
+            <p:ph type="sldImg"/>
+          </p:nvPr>
+        </p:nvSpPr>
+        <p:spPr/>
+      </p:sp>
+      <p:sp>
+        <p:nvSpPr>
+          <p:cNvPr id="3" name="Notes Placeholder 2"/>
+          <p:cNvSpPr>
+            <a:spLocks noGrp="1"/>
+          </p:cNvSpPr>
+          <p:nvPr>
+            <p:ph type="body" idx="1"/>
+          </p:nvPr>
+        </p:nvSpPr>
+        <p:spPr/>
+        <p:txBody>
+          <a:bodyPr/>
+          <a:lstStyle/>
+          <a:p>
+            <a:r>
+              <a:rPr lang="en-US" dirty="0" smtClean="0"/>
+              <a:t>In </a:t>
+            </a:r>
+            <a:r>
+              <a:rPr lang="en-US" dirty="0" err="1" smtClean="0"/>
+              <a:t>RequireJS</a:t>
+            </a:r>
+            <a:r>
+              <a:rPr lang="en-US" dirty="0" smtClean="0"/>
+              <a:t> all code is wrapped in either one of two functions,</a:t>
+            </a:r>
+            <a:r>
+              <a:rPr lang="en-US" baseline="0" dirty="0" smtClean="0"/>
+              <a:t> require() or define()</a:t>
+            </a:r>
+          </a:p>
+          <a:p>
+            <a:endParaRPr lang="en-US" baseline="0" dirty="0" smtClean="0"/>
+          </a:p>
+          <a:p>
+            <a:r>
+              <a:rPr lang="en-US" baseline="0" dirty="0" smtClean="0"/>
+              <a:t>The require() function will mainly be used in one file or so, while the define()function will be used multiple times</a:t>
+            </a:r>
+          </a:p>
+          <a:p>
+            <a:endParaRPr lang="en-US" baseline="0" dirty="0" smtClean="0"/>
+          </a:p>
+          <a:p>
+            <a:r>
+              <a:rPr lang="en-US" baseline="0" dirty="0" smtClean="0"/>
+              <a:t>Lets move on to our example code to show you how this all works</a:t>
+            </a:r>
+            <a:endParaRPr lang="en-US" dirty="0"/>
+          </a:p>
+        </p:txBody>
+      </p:sp>
+      <p:sp>
+        <p:nvSpPr>
+          <p:cNvPr id="4" name="Slide Number Placeholder 3"/>
+          <p:cNvSpPr>
+            <a:spLocks noGrp="1"/>
+          </p:cNvSpPr>
+          <p:nvPr>
+            <p:ph type="sldNum" sz="quarter" idx="10"/>
+          </p:nvPr>
+        </p:nvSpPr>
+        <p:spPr/>
+        <p:txBody>
+          <a:bodyPr/>
+          <a:lstStyle/>
+          <a:p>
+            <a:fld id="{4CFD207A-07DF-40AD-A916-9872E089CE7A}" type="slidenum">
+              <a:rPr lang="en-US" smtClean="0"/>
+              <a:t>15</a:t>
+            </a:fld>
+            <a:endParaRPr lang="en-US"/>
+          </a:p>
+        </p:txBody>
+      </p:sp>
+    </p:spTree>
+    <p:extLst>
+      <p:ext uri="{BB962C8B-B14F-4D97-AF65-F5344CB8AC3E}">
+        <p14:creationId xmlns:p14="http://schemas.microsoft.com/office/powerpoint/2010/main" val="3797052575"/>
       </p:ext>
     </p:extLst>
   </p:cSld>
@@ -15560,7 +15902,7 @@
       </p:grpSpPr>
       <p:sp>
         <p:nvSpPr>
-          <p:cNvPr id="2" name="Title 1"/>
+          <p:cNvPr id="4" name="Title 3"/>
           <p:cNvSpPr>
             <a:spLocks noGrp="1"/>
           </p:cNvSpPr>
@@ -15575,7 +15917,7 @@
           <a:p>
             <a:r>
               <a:rPr lang="en-US" dirty="0" smtClean="0"/>
-              <a:t>Summary</a:t>
+              <a:t>Modules	</a:t>
             </a:r>
             <a:endParaRPr lang="en-US" dirty="0"/>
           </a:p>
@@ -15583,7 +15925,7 @@
       </p:sp>
       <p:sp>
         <p:nvSpPr>
-          <p:cNvPr id="7" name="Content Placeholder 6"/>
+          <p:cNvPr id="5" name="Content Placeholder 4"/>
           <p:cNvSpPr>
             <a:spLocks noGrp="1"/>
           </p:cNvSpPr>
@@ -15593,12 +15935,40 @@
         </p:nvSpPr>
         <p:spPr/>
         <p:txBody>
-          <a:bodyPr>
-            <a:normAutofit/>
-          </a:bodyPr>
+          <a:bodyPr/>
           <a:lstStyle/>
           <a:p>
-            <a:pPr fontAlgn="ctr"/>
+            <a:r>
+              <a:rPr lang="en-US" dirty="0" smtClean="0"/>
+              <a:t>Modules in JavaScript are small units of reusable code</a:t>
+            </a:r>
+          </a:p>
+          <a:p>
+            <a:endParaRPr lang="en-US" dirty="0" smtClean="0"/>
+          </a:p>
+          <a:p>
+            <a:r>
+              <a:rPr lang="en-US" dirty="0" smtClean="0"/>
+              <a:t>Modules are used to export a value, rather than to define a type</a:t>
+            </a:r>
+          </a:p>
+          <a:p>
+            <a:endParaRPr lang="en-US" dirty="0" smtClean="0"/>
+          </a:p>
+          <a:p>
+            <a:r>
+              <a:rPr lang="en-US" dirty="0" smtClean="0"/>
+              <a:t>Usually export objects, functions or constructors </a:t>
+            </a:r>
+          </a:p>
+          <a:p>
+            <a:endParaRPr lang="en-US" dirty="0"/>
+          </a:p>
+          <a:p>
+            <a:r>
+              <a:rPr lang="en-US" dirty="0" smtClean="0"/>
+              <a:t>Modules usually belong to a package, which is made of many different modules</a:t>
+            </a:r>
             <a:endParaRPr lang="en-US" dirty="0"/>
           </a:p>
         </p:txBody>
@@ -15606,20 +15976,13 @@
     </p:spTree>
     <p:extLst>
       <p:ext uri="{BB962C8B-B14F-4D97-AF65-F5344CB8AC3E}">
-        <p14:creationId xmlns:p14="http://schemas.microsoft.com/office/powerpoint/2010/main" val="934332795"/>
+        <p14:creationId xmlns:p14="http://schemas.microsoft.com/office/powerpoint/2010/main" val="1949456690"/>
       </p:ext>
     </p:extLst>
   </p:cSld>
   <p:clrMapOvr>
     <a:masterClrMapping/>
   </p:clrMapOvr>
-  <p:timing>
-    <p:tnLst>
-      <p:par>
-        <p:cTn id="1" dur="indefinite" restart="never" nodeType="tmRoot"/>
-      </p:par>
-    </p:tnLst>
-  </p:timing>
 </p:sld>
 </file>
 
@@ -15640,10 +16003,503 @@
           <a:chExt cx="0" cy="0"/>
         </a:xfrm>
       </p:grpSpPr>
+      <p:sp>
+        <p:nvSpPr>
+          <p:cNvPr id="2" name="Title 1"/>
+          <p:cNvSpPr>
+            <a:spLocks noGrp="1"/>
+          </p:cNvSpPr>
+          <p:nvPr>
+            <p:ph type="title"/>
+          </p:nvPr>
+        </p:nvSpPr>
+        <p:spPr/>
+        <p:txBody>
+          <a:bodyPr/>
+          <a:lstStyle/>
+          <a:p>
+            <a:r>
+              <a:rPr lang="en-US" dirty="0" err="1" smtClean="0"/>
+              <a:t>RequireJS</a:t>
+            </a:r>
+            <a:endParaRPr lang="en-US" dirty="0"/>
+          </a:p>
+        </p:txBody>
+      </p:sp>
+      <p:sp>
+        <p:nvSpPr>
+          <p:cNvPr id="3" name="Content Placeholder 2"/>
+          <p:cNvSpPr>
+            <a:spLocks noGrp="1"/>
+          </p:cNvSpPr>
+          <p:nvPr>
+            <p:ph sz="quarter" idx="10"/>
+          </p:nvPr>
+        </p:nvSpPr>
+        <p:spPr/>
+        <p:txBody>
+          <a:bodyPr/>
+          <a:lstStyle/>
+          <a:p>
+            <a:r>
+              <a:rPr lang="en-US" dirty="0" smtClean="0"/>
+              <a:t>A framework used to load JavaScript files and modules</a:t>
+            </a:r>
+          </a:p>
+          <a:p>
+            <a:endParaRPr lang="en-US" dirty="0"/>
+          </a:p>
+          <a:p>
+            <a:r>
+              <a:rPr lang="en-US" dirty="0" smtClean="0"/>
+              <a:t>Uses the Asynchronous Module Definition to load files</a:t>
+            </a:r>
+          </a:p>
+          <a:p>
+            <a:pPr lvl="1"/>
+            <a:r>
+              <a:rPr lang="en-US" dirty="0" smtClean="0"/>
+              <a:t>Each module starts loading through asynchronous requests in a given order</a:t>
+            </a:r>
+          </a:p>
+          <a:p>
+            <a:pPr lvl="1"/>
+            <a:endParaRPr lang="en-US" dirty="0"/>
+          </a:p>
+          <a:p>
+            <a:r>
+              <a:rPr lang="en-US" dirty="0" smtClean="0"/>
+              <a:t>Can be used with jQuery, Node.js and Dojo</a:t>
+            </a:r>
+            <a:endParaRPr lang="en-US" dirty="0"/>
+          </a:p>
+        </p:txBody>
+      </p:sp>
     </p:spTree>
     <p:extLst>
       <p:ext uri="{BB962C8B-B14F-4D97-AF65-F5344CB8AC3E}">
-        <p14:creationId xmlns:p14="http://schemas.microsoft.com/office/powerpoint/2010/main" val="898363405"/>
+        <p14:creationId xmlns:p14="http://schemas.microsoft.com/office/powerpoint/2010/main" val="2987267839"/>
+      </p:ext>
+    </p:extLst>
+  </p:cSld>
+  <p:clrMapOvr>
+    <a:masterClrMapping/>
+  </p:clrMapOvr>
+</p:sld>
+</file>
+
+<file path=ppt/slides/slide15.xml><?xml version="1.0" encoding="utf-8"?>
+<p:sld xmlns:a="http://schemas.openxmlformats.org/drawingml/2006/main" xmlns:r="http://schemas.openxmlformats.org/officeDocument/2006/relationships" xmlns:p="http://schemas.openxmlformats.org/presentationml/2006/main">
+  <p:cSld>
+    <p:spTree>
+      <p:nvGrpSpPr>
+        <p:cNvPr id="1" name=""/>
+        <p:cNvGrpSpPr/>
+        <p:nvPr/>
+      </p:nvGrpSpPr>
+      <p:grpSpPr>
+        <a:xfrm>
+          <a:off x="0" y="0"/>
+          <a:ext cx="0" cy="0"/>
+          <a:chOff x="0" y="0"/>
+          <a:chExt cx="0" cy="0"/>
+        </a:xfrm>
+      </p:grpSpPr>
+      <p:sp>
+        <p:nvSpPr>
+          <p:cNvPr id="5" name="Content Placeholder 4"/>
+          <p:cNvSpPr>
+            <a:spLocks noGrp="1"/>
+          </p:cNvSpPr>
+          <p:nvPr>
+            <p:ph sz="half" idx="2"/>
+          </p:nvPr>
+        </p:nvSpPr>
+        <p:spPr/>
+        <p:txBody>
+          <a:bodyPr/>
+          <a:lstStyle/>
+          <a:p>
+            <a:pPr marL="0" indent="0">
+              <a:buNone/>
+            </a:pPr>
+            <a:r>
+              <a:rPr lang="en-US" dirty="0" smtClean="0"/>
+              <a:t>Require()</a:t>
+            </a:r>
+          </a:p>
+          <a:p>
+            <a:pPr marL="0" indent="0">
+              <a:buNone/>
+            </a:pPr>
+            <a:endParaRPr lang="en-US" dirty="0"/>
+          </a:p>
+          <a:p>
+            <a:pPr marL="0" indent="0">
+              <a:buNone/>
+            </a:pPr>
+            <a:r>
+              <a:rPr lang="en-US" dirty="0" smtClean="0"/>
+              <a:t>Require() is used to run immediate functionalities	</a:t>
+            </a:r>
+            <a:endParaRPr lang="en-US" dirty="0"/>
+          </a:p>
+        </p:txBody>
+      </p:sp>
+      <p:sp>
+        <p:nvSpPr>
+          <p:cNvPr id="6" name="Content Placeholder 5"/>
+          <p:cNvSpPr>
+            <a:spLocks noGrp="1"/>
+          </p:cNvSpPr>
+          <p:nvPr>
+            <p:ph sz="quarter" idx="4"/>
+          </p:nvPr>
+        </p:nvSpPr>
+        <p:spPr/>
+        <p:txBody>
+          <a:bodyPr/>
+          <a:lstStyle/>
+          <a:p>
+            <a:pPr marL="0" indent="0">
+              <a:buNone/>
+            </a:pPr>
+            <a:r>
+              <a:rPr lang="en-US" dirty="0" smtClean="0"/>
+              <a:t>Define()</a:t>
+            </a:r>
+          </a:p>
+          <a:p>
+            <a:pPr marL="0" indent="0">
+              <a:buNone/>
+            </a:pPr>
+            <a:endParaRPr lang="en-US" dirty="0"/>
+          </a:p>
+          <a:p>
+            <a:pPr marL="0" indent="0">
+              <a:buNone/>
+            </a:pPr>
+            <a:r>
+              <a:rPr lang="en-US" dirty="0" smtClean="0"/>
+              <a:t>Define() is used to define modules for use in multiple locations</a:t>
+            </a:r>
+            <a:endParaRPr lang="en-US" dirty="0"/>
+          </a:p>
+        </p:txBody>
+      </p:sp>
+      <p:sp>
+        <p:nvSpPr>
+          <p:cNvPr id="4" name="Title 3"/>
+          <p:cNvSpPr>
+            <a:spLocks noGrp="1"/>
+          </p:cNvSpPr>
+          <p:nvPr>
+            <p:ph type="title"/>
+          </p:nvPr>
+        </p:nvSpPr>
+        <p:spPr/>
+        <p:txBody>
+          <a:bodyPr>
+            <a:normAutofit/>
+          </a:bodyPr>
+          <a:lstStyle/>
+          <a:p>
+            <a:r>
+              <a:rPr lang="en-US" dirty="0" smtClean="0"/>
+              <a:t>Two Important Key functions	</a:t>
+            </a:r>
+            <a:endParaRPr lang="en-US" dirty="0"/>
+          </a:p>
+        </p:txBody>
+      </p:sp>
+    </p:spTree>
+    <p:extLst>
+      <p:ext uri="{BB962C8B-B14F-4D97-AF65-F5344CB8AC3E}">
+        <p14:creationId xmlns:p14="http://schemas.microsoft.com/office/powerpoint/2010/main" val="1942344078"/>
+      </p:ext>
+    </p:extLst>
+  </p:cSld>
+  <p:clrMapOvr>
+    <a:masterClrMapping/>
+  </p:clrMapOvr>
+</p:sld>
+</file>
+
+<file path=ppt/slides/slide16.xml><?xml version="1.0" encoding="utf-8"?>
+<p:sld xmlns:a="http://schemas.openxmlformats.org/drawingml/2006/main" xmlns:r="http://schemas.openxmlformats.org/officeDocument/2006/relationships" xmlns:p="http://schemas.openxmlformats.org/presentationml/2006/main">
+  <p:cSld>
+    <p:spTree>
+      <p:nvGrpSpPr>
+        <p:cNvPr id="1" name=""/>
+        <p:cNvGrpSpPr/>
+        <p:nvPr/>
+      </p:nvGrpSpPr>
+      <p:grpSpPr>
+        <a:xfrm>
+          <a:off x="0" y="0"/>
+          <a:ext cx="0" cy="0"/>
+          <a:chOff x="0" y="0"/>
+          <a:chExt cx="0" cy="0"/>
+        </a:xfrm>
+      </p:grpSpPr>
+      <p:sp>
+        <p:nvSpPr>
+          <p:cNvPr id="6" name="Title 5"/>
+          <p:cNvSpPr>
+            <a:spLocks noGrp="1"/>
+          </p:cNvSpPr>
+          <p:nvPr>
+            <p:ph type="title"/>
+          </p:nvPr>
+        </p:nvSpPr>
+        <p:spPr/>
+        <p:txBody>
+          <a:bodyPr/>
+          <a:lstStyle/>
+          <a:p>
+            <a:r>
+              <a:rPr lang="en-US" dirty="0" smtClean="0"/>
+              <a:t>Using </a:t>
+            </a:r>
+            <a:r>
+              <a:rPr lang="en-US" dirty="0" err="1" smtClean="0"/>
+              <a:t>RequireJS</a:t>
+            </a:r>
+            <a:endParaRPr lang="en-US" dirty="0"/>
+          </a:p>
+        </p:txBody>
+      </p:sp>
+    </p:spTree>
+    <p:extLst>
+      <p:ext uri="{BB962C8B-B14F-4D97-AF65-F5344CB8AC3E}">
+        <p14:creationId xmlns:p14="http://schemas.microsoft.com/office/powerpoint/2010/main" val="1992751969"/>
+      </p:ext>
+    </p:extLst>
+  </p:cSld>
+  <p:clrMapOvr>
+    <a:masterClrMapping/>
+  </p:clrMapOvr>
+</p:sld>
+</file>
+
+<file path=ppt/slides/slide17.xml><?xml version="1.0" encoding="utf-8"?>
+<p:sld xmlns:a="http://schemas.openxmlformats.org/drawingml/2006/main" xmlns:r="http://schemas.openxmlformats.org/officeDocument/2006/relationships" xmlns:p="http://schemas.openxmlformats.org/presentationml/2006/main">
+  <p:cSld>
+    <p:spTree>
+      <p:nvGrpSpPr>
+        <p:cNvPr id="1" name=""/>
+        <p:cNvGrpSpPr/>
+        <p:nvPr/>
+      </p:nvGrpSpPr>
+      <p:grpSpPr>
+        <a:xfrm>
+          <a:off x="0" y="0"/>
+          <a:ext cx="0" cy="0"/>
+          <a:chOff x="0" y="0"/>
+          <a:chExt cx="0" cy="0"/>
+        </a:xfrm>
+      </p:grpSpPr>
+      <p:sp>
+        <p:nvSpPr>
+          <p:cNvPr id="4" name="Text Placeholder 3"/>
+          <p:cNvSpPr>
+            <a:spLocks noGrp="1"/>
+          </p:cNvSpPr>
+          <p:nvPr>
+            <p:ph type="body" sz="quarter" idx="10"/>
+          </p:nvPr>
+        </p:nvSpPr>
+        <p:spPr/>
+        <p:txBody>
+          <a:bodyPr/>
+          <a:lstStyle/>
+          <a:p>
+            <a:r>
+              <a:rPr lang="en-US" dirty="0" smtClean="0"/>
+              <a:t>AngularJS</a:t>
+            </a:r>
+            <a:endParaRPr lang="en-US" dirty="0"/>
+          </a:p>
+        </p:txBody>
+      </p:sp>
+      <p:sp>
+        <p:nvSpPr>
+          <p:cNvPr id="3" name="Subtitle 2"/>
+          <p:cNvSpPr>
+            <a:spLocks noGrp="1"/>
+          </p:cNvSpPr>
+          <p:nvPr>
+            <p:ph type="subTitle" idx="1"/>
+          </p:nvPr>
+        </p:nvSpPr>
+        <p:spPr/>
+        <p:txBody>
+          <a:bodyPr/>
+          <a:lstStyle/>
+          <a:p>
+            <a:endParaRPr lang="en-US"/>
+          </a:p>
+        </p:txBody>
+      </p:sp>
+    </p:spTree>
+    <p:extLst>
+      <p:ext uri="{BB962C8B-B14F-4D97-AF65-F5344CB8AC3E}">
+        <p14:creationId xmlns:p14="http://schemas.microsoft.com/office/powerpoint/2010/main" val="4217927835"/>
+      </p:ext>
+    </p:extLst>
+  </p:cSld>
+  <p:clrMapOvr>
+    <a:masterClrMapping/>
+  </p:clrMapOvr>
+</p:sld>
+</file>
+
+<file path=ppt/slides/slide18.xml><?xml version="1.0" encoding="utf-8"?>
+<p:sld xmlns:a="http://schemas.openxmlformats.org/drawingml/2006/main" xmlns:r="http://schemas.openxmlformats.org/officeDocument/2006/relationships" xmlns:p="http://schemas.openxmlformats.org/presentationml/2006/main">
+  <p:cSld>
+    <p:spTree>
+      <p:nvGrpSpPr>
+        <p:cNvPr id="1" name=""/>
+        <p:cNvGrpSpPr/>
+        <p:nvPr/>
+      </p:nvGrpSpPr>
+      <p:grpSpPr>
+        <a:xfrm>
+          <a:off x="0" y="0"/>
+          <a:ext cx="0" cy="0"/>
+          <a:chOff x="0" y="0"/>
+          <a:chExt cx="0" cy="0"/>
+        </a:xfrm>
+      </p:grpSpPr>
+      <p:sp>
+        <p:nvSpPr>
+          <p:cNvPr id="4" name="Title 3"/>
+          <p:cNvSpPr>
+            <a:spLocks noGrp="1"/>
+          </p:cNvSpPr>
+          <p:nvPr>
+            <p:ph type="title"/>
+          </p:nvPr>
+        </p:nvSpPr>
+        <p:spPr/>
+        <p:txBody>
+          <a:bodyPr/>
+          <a:lstStyle/>
+          <a:p>
+            <a:r>
+              <a:rPr lang="en-US" dirty="0" smtClean="0"/>
+              <a:t>AngularJS	</a:t>
+            </a:r>
+            <a:endParaRPr lang="en-US" dirty="0"/>
+          </a:p>
+        </p:txBody>
+      </p:sp>
+      <p:sp>
+        <p:nvSpPr>
+          <p:cNvPr id="5" name="Content Placeholder 4"/>
+          <p:cNvSpPr>
+            <a:spLocks noGrp="1"/>
+          </p:cNvSpPr>
+          <p:nvPr>
+            <p:ph sz="quarter" idx="10"/>
+          </p:nvPr>
+        </p:nvSpPr>
+        <p:spPr/>
+        <p:txBody>
+          <a:bodyPr/>
+          <a:lstStyle/>
+          <a:p>
+            <a:r>
+              <a:rPr lang="en-US" dirty="0" smtClean="0"/>
+              <a:t>AngularJS is a JavaScript framework that is used to extend </a:t>
+            </a:r>
+            <a:r>
+              <a:rPr lang="en-US" smtClean="0"/>
+              <a:t>HTML attributes</a:t>
+            </a:r>
+            <a:endParaRPr lang="en-US" dirty="0"/>
+          </a:p>
+        </p:txBody>
+      </p:sp>
+    </p:spTree>
+    <p:extLst>
+      <p:ext uri="{BB962C8B-B14F-4D97-AF65-F5344CB8AC3E}">
+        <p14:creationId xmlns:p14="http://schemas.microsoft.com/office/powerpoint/2010/main" val="1789703133"/>
+      </p:ext>
+    </p:extLst>
+  </p:cSld>
+  <p:clrMapOvr>
+    <a:masterClrMapping/>
+  </p:clrMapOvr>
+</p:sld>
+</file>
+
+<file path=ppt/slides/slide19.xml><?xml version="1.0" encoding="utf-8"?>
+<p:sld xmlns:a="http://schemas.openxmlformats.org/drawingml/2006/main" xmlns:r="http://schemas.openxmlformats.org/officeDocument/2006/relationships" xmlns:p="http://schemas.openxmlformats.org/presentationml/2006/main">
+  <p:cSld>
+    <p:spTree>
+      <p:nvGrpSpPr>
+        <p:cNvPr id="1" name=""/>
+        <p:cNvGrpSpPr/>
+        <p:nvPr/>
+      </p:nvGrpSpPr>
+      <p:grpSpPr>
+        <a:xfrm>
+          <a:off x="0" y="0"/>
+          <a:ext cx="0" cy="0"/>
+          <a:chOff x="0" y="0"/>
+          <a:chExt cx="0" cy="0"/>
+        </a:xfrm>
+      </p:grpSpPr>
+      <p:sp>
+        <p:nvSpPr>
+          <p:cNvPr id="2" name="Title 1"/>
+          <p:cNvSpPr>
+            <a:spLocks noGrp="1"/>
+          </p:cNvSpPr>
+          <p:nvPr>
+            <p:ph type="title"/>
+          </p:nvPr>
+        </p:nvSpPr>
+        <p:spPr/>
+        <p:txBody>
+          <a:bodyPr/>
+          <a:lstStyle/>
+          <a:p>
+            <a:r>
+              <a:rPr lang="en-US" dirty="0" smtClean="0"/>
+              <a:t>Summary</a:t>
+            </a:r>
+            <a:endParaRPr lang="en-US" dirty="0"/>
+          </a:p>
+        </p:txBody>
+      </p:sp>
+      <p:sp>
+        <p:nvSpPr>
+          <p:cNvPr id="7" name="Content Placeholder 6"/>
+          <p:cNvSpPr>
+            <a:spLocks noGrp="1"/>
+          </p:cNvSpPr>
+          <p:nvPr>
+            <p:ph sz="quarter" idx="10"/>
+          </p:nvPr>
+        </p:nvSpPr>
+        <p:spPr/>
+        <p:txBody>
+          <a:bodyPr>
+            <a:normAutofit/>
+          </a:bodyPr>
+          <a:lstStyle/>
+          <a:p>
+            <a:pPr fontAlgn="ctr"/>
+            <a:endParaRPr lang="en-US" dirty="0"/>
+          </a:p>
+        </p:txBody>
+      </p:sp>
+    </p:spTree>
+    <p:extLst>
+      <p:ext uri="{BB962C8B-B14F-4D97-AF65-F5344CB8AC3E}">
+        <p14:creationId xmlns:p14="http://schemas.microsoft.com/office/powerpoint/2010/main" val="934332795"/>
       </p:ext>
     </p:extLst>
   </p:cSld>
@@ -16086,6 +16942,43 @@
 </p:sld>
 </file>
 
+<file path=ppt/slides/slide20.xml><?xml version="1.0" encoding="utf-8"?>
+<p:sld xmlns:a="http://schemas.openxmlformats.org/drawingml/2006/main" xmlns:r="http://schemas.openxmlformats.org/officeDocument/2006/relationships" xmlns:p="http://schemas.openxmlformats.org/presentationml/2006/main">
+  <p:cSld>
+    <p:spTree>
+      <p:nvGrpSpPr>
+        <p:cNvPr id="1" name=""/>
+        <p:cNvGrpSpPr/>
+        <p:nvPr/>
+      </p:nvGrpSpPr>
+      <p:grpSpPr>
+        <a:xfrm>
+          <a:off x="0" y="0"/>
+          <a:ext cx="0" cy="0"/>
+          <a:chOff x="0" y="0"/>
+          <a:chExt cx="0" cy="0"/>
+        </a:xfrm>
+      </p:grpSpPr>
+    </p:spTree>
+    <p:extLst>
+      <p:ext uri="{BB962C8B-B14F-4D97-AF65-F5344CB8AC3E}">
+        <p14:creationId xmlns:p14="http://schemas.microsoft.com/office/powerpoint/2010/main" val="898363405"/>
+      </p:ext>
+    </p:extLst>
+  </p:cSld>
+  <p:clrMapOvr>
+    <a:masterClrMapping/>
+  </p:clrMapOvr>
+  <p:timing>
+    <p:tnLst>
+      <p:par>
+        <p:cTn id="1" dur="indefinite" restart="never" nodeType="tmRoot"/>
+      </p:par>
+    </p:tnLst>
+  </p:timing>
+</p:sld>
+</file>
+
 <file path=ppt/slides/slide3.xml><?xml version="1.0" encoding="utf-8"?>
 <p:sld xmlns:a="http://schemas.openxmlformats.org/drawingml/2006/main" xmlns:r="http://schemas.openxmlformats.org/officeDocument/2006/relationships" xmlns:p="http://schemas.openxmlformats.org/presentationml/2006/main">
   <p:cSld>
@@ -16144,6 +17037,25 @@
           <a:lstStyle/>
           <a:p>
             <a:pPr fontAlgn="ctr"/>
+            <a:r>
+              <a:rPr lang="en-US" dirty="0" smtClean="0"/>
+              <a:t>jQuery</a:t>
+            </a:r>
+          </a:p>
+          <a:p>
+            <a:pPr fontAlgn="ctr"/>
+            <a:r>
+              <a:rPr lang="en-US" dirty="0" err="1" smtClean="0"/>
+              <a:t>RequireJS</a:t>
+            </a:r>
+            <a:endParaRPr lang="en-US" dirty="0" smtClean="0"/>
+          </a:p>
+          <a:p>
+            <a:pPr fontAlgn="ctr"/>
+            <a:r>
+              <a:rPr lang="en-US" dirty="0" smtClean="0"/>
+              <a:t>Angular</a:t>
+            </a:r>
             <a:endParaRPr lang="en-US" dirty="0"/>
           </a:p>
         </p:txBody>

</xml_diff>

<commit_message>
Updates to mod 5 slides
</commit_message>
<xml_diff>
--- a/Slides/Module 5 - JS Libraries.pptx
+++ b/Slides/Module 5 - JS Libraries.pptx
@@ -6,10 +6,10 @@
     <p:sldMasterId id="2147483679" r:id="rId5"/>
   </p:sldMasterIdLst>
   <p:notesMasterIdLst>
-    <p:notesMasterId r:id="rId24"/>
+    <p:notesMasterId r:id="rId30"/>
   </p:notesMasterIdLst>
   <p:handoutMasterIdLst>
-    <p:handoutMasterId r:id="rId25"/>
+    <p:handoutMasterId r:id="rId31"/>
   </p:handoutMasterIdLst>
   <p:sldIdLst>
     <p:sldId id="271" r:id="rId6"/>
@@ -28,8 +28,14 @@
     <p:sldId id="340" r:id="rId19"/>
     <p:sldId id="342" r:id="rId20"/>
     <p:sldId id="341" r:id="rId21"/>
-    <p:sldId id="286" r:id="rId22"/>
-    <p:sldId id="269" r:id="rId23"/>
+    <p:sldId id="343" r:id="rId22"/>
+    <p:sldId id="344" r:id="rId23"/>
+    <p:sldId id="345" r:id="rId24"/>
+    <p:sldId id="346" r:id="rId25"/>
+    <p:sldId id="347" r:id="rId26"/>
+    <p:sldId id="348" r:id="rId27"/>
+    <p:sldId id="286" r:id="rId28"/>
+    <p:sldId id="269" r:id="rId29"/>
   </p:sldIdLst>
   <p:sldSz cx="12192000" cy="6858000"/>
   <p:notesSz cx="6858000" cy="9144000"/>
@@ -161,6 +167,12 @@
             <p14:sldId id="340"/>
             <p14:sldId id="342"/>
             <p14:sldId id="341"/>
+            <p14:sldId id="343"/>
+            <p14:sldId id="344"/>
+            <p14:sldId id="345"/>
+            <p14:sldId id="346"/>
+            <p14:sldId id="347"/>
+            <p14:sldId id="348"/>
           </p14:sldIdLst>
         </p14:section>
         <p14:section name="Summary" id="{4292E653-E0D1-474E-9B1E-023385F76563}">
@@ -896,7 +908,7 @@
             <a:fld id="{13F0F35F-DD44-4607-AEC1-49D7A4BC4066}" type="slidenum">
               <a:rPr lang="en-US" smtClean="0"/>
               <a:pPr/>
-              <a:t>17</a:t>
+              <a:t>23</a:t>
             </a:fld>
             <a:endParaRPr lang="en-US" dirty="0"/>
           </a:p>
@@ -16293,12 +16305,12 @@
       </p:grpSpPr>
       <p:sp>
         <p:nvSpPr>
-          <p:cNvPr id="2" name="Title 1"/>
+          <p:cNvPr id="6" name="Text Placeholder 5"/>
           <p:cNvSpPr>
             <a:spLocks noGrp="1"/>
           </p:cNvSpPr>
           <p:nvPr>
-            <p:ph type="title"/>
+            <p:ph type="body" sz="quarter" idx="10"/>
           </p:nvPr>
         </p:nvSpPr>
         <p:spPr/>
@@ -16308,7 +16320,7 @@
           <a:p>
             <a:r>
               <a:rPr lang="en-US" dirty="0" smtClean="0"/>
-              <a:t>Summary</a:t>
+              <a:t>Other libraries</a:t>
             </a:r>
             <a:endParaRPr lang="en-US" dirty="0"/>
           </a:p>
@@ -16316,41 +16328,19 @@
       </p:sp>
       <p:sp>
         <p:nvSpPr>
-          <p:cNvPr id="7" name="Content Placeholder 6"/>
+          <p:cNvPr id="5" name="Subtitle 4"/>
           <p:cNvSpPr>
             <a:spLocks noGrp="1"/>
           </p:cNvSpPr>
           <p:nvPr>
-            <p:ph sz="quarter" idx="10"/>
+            <p:ph type="subTitle" idx="1"/>
           </p:nvPr>
         </p:nvSpPr>
         <p:spPr/>
         <p:txBody>
-          <a:bodyPr>
-            <a:normAutofit/>
-          </a:bodyPr>
+          <a:bodyPr/>
           <a:lstStyle/>
           <a:p>
-            <a:pPr fontAlgn="ctr"/>
-            <a:r>
-              <a:rPr lang="en-US" dirty="0"/>
-              <a:t>jQuery</a:t>
-            </a:r>
-          </a:p>
-          <a:p>
-            <a:pPr fontAlgn="ctr"/>
-            <a:r>
-              <a:rPr lang="en-US" dirty="0" err="1"/>
-              <a:t>RequireJS</a:t>
-            </a:r>
-            <a:endParaRPr lang="en-US" dirty="0"/>
-          </a:p>
-          <a:p>
-            <a:pPr fontAlgn="ctr"/>
-            <a:r>
-              <a:rPr lang="en-US" dirty="0" err="1"/>
-              <a:t>Microjs</a:t>
-            </a:r>
             <a:endParaRPr lang="en-US" dirty="0"/>
           </a:p>
         </p:txBody>
@@ -16358,20 +16348,13 @@
     </p:spTree>
     <p:extLst>
       <p:ext uri="{BB962C8B-B14F-4D97-AF65-F5344CB8AC3E}">
-        <p14:creationId xmlns:p14="http://schemas.microsoft.com/office/powerpoint/2010/main" val="934332795"/>
+        <p14:creationId xmlns:p14="http://schemas.microsoft.com/office/powerpoint/2010/main" val="2325688788"/>
       </p:ext>
     </p:extLst>
   </p:cSld>
   <p:clrMapOvr>
     <a:masterClrMapping/>
   </p:clrMapOvr>
-  <p:timing>
-    <p:tnLst>
-      <p:par>
-        <p:cTn id="1" dur="indefinite" restart="never" nodeType="tmRoot"/>
-      </p:par>
-    </p:tnLst>
-  </p:timing>
 </p:sld>
 </file>
 
@@ -16392,23 +16375,162 @@
           <a:chExt cx="0" cy="0"/>
         </a:xfrm>
       </p:grpSpPr>
+      <p:sp>
+        <p:nvSpPr>
+          <p:cNvPr id="4" name="Title 3"/>
+          <p:cNvSpPr>
+            <a:spLocks noGrp="1"/>
+          </p:cNvSpPr>
+          <p:nvPr>
+            <p:ph type="title"/>
+          </p:nvPr>
+        </p:nvSpPr>
+        <p:spPr/>
+        <p:txBody>
+          <a:bodyPr/>
+          <a:lstStyle/>
+          <a:p>
+            <a:r>
+              <a:rPr lang="en-US" dirty="0" smtClean="0"/>
+              <a:t>Other libraries</a:t>
+            </a:r>
+            <a:endParaRPr lang="en-US" dirty="0"/>
+          </a:p>
+        </p:txBody>
+      </p:sp>
+      <p:sp>
+        <p:nvSpPr>
+          <p:cNvPr id="5" name="Content Placeholder 4"/>
+          <p:cNvSpPr>
+            <a:spLocks noGrp="1"/>
+          </p:cNvSpPr>
+          <p:nvPr>
+            <p:ph sz="quarter" idx="10"/>
+          </p:nvPr>
+        </p:nvSpPr>
+        <p:spPr/>
+        <p:txBody>
+          <a:bodyPr/>
+          <a:lstStyle/>
+          <a:p>
+            <a:r>
+              <a:rPr lang="en-US" dirty="0" smtClean="0"/>
+              <a:t>“We’re not launching rockets here”</a:t>
+            </a:r>
+          </a:p>
+          <a:p>
+            <a:r>
+              <a:rPr lang="en-US" dirty="0" smtClean="0"/>
+              <a:t>Whatever it is you’re doing, someone else has already done it</a:t>
+            </a:r>
+          </a:p>
+          <a:p>
+            <a:pPr lvl="1"/>
+            <a:r>
+              <a:rPr lang="en-US" dirty="0" smtClean="0"/>
+              <a:t>Take advantage of their work!!</a:t>
+            </a:r>
+            <a:endParaRPr lang="en-US" dirty="0"/>
+          </a:p>
+        </p:txBody>
+      </p:sp>
     </p:spTree>
     <p:extLst>
       <p:ext uri="{BB962C8B-B14F-4D97-AF65-F5344CB8AC3E}">
-        <p14:creationId xmlns:p14="http://schemas.microsoft.com/office/powerpoint/2010/main" val="898363405"/>
+        <p14:creationId xmlns:p14="http://schemas.microsoft.com/office/powerpoint/2010/main" val="3377178019"/>
       </p:ext>
     </p:extLst>
   </p:cSld>
   <p:clrMapOvr>
     <a:masterClrMapping/>
   </p:clrMapOvr>
-  <p:timing>
-    <p:tnLst>
-      <p:par>
-        <p:cTn id="1" dur="indefinite" restart="never" nodeType="tmRoot"/>
-      </p:par>
-    </p:tnLst>
-  </p:timing>
+</p:sld>
+</file>
+
+<file path=ppt/slides/slide19.xml><?xml version="1.0" encoding="utf-8"?>
+<p:sld xmlns:a="http://schemas.openxmlformats.org/drawingml/2006/main" xmlns:r="http://schemas.openxmlformats.org/officeDocument/2006/relationships" xmlns:p="http://schemas.openxmlformats.org/presentationml/2006/main">
+  <p:cSld>
+    <p:spTree>
+      <p:nvGrpSpPr>
+        <p:cNvPr id="1" name=""/>
+        <p:cNvGrpSpPr/>
+        <p:nvPr/>
+      </p:nvGrpSpPr>
+      <p:grpSpPr>
+        <a:xfrm>
+          <a:off x="0" y="0"/>
+          <a:ext cx="0" cy="0"/>
+          <a:chOff x="0" y="0"/>
+          <a:chExt cx="0" cy="0"/>
+        </a:xfrm>
+      </p:grpSpPr>
+      <p:sp>
+        <p:nvSpPr>
+          <p:cNvPr id="2" name="Title 1"/>
+          <p:cNvSpPr>
+            <a:spLocks noGrp="1"/>
+          </p:cNvSpPr>
+          <p:nvPr>
+            <p:ph type="title"/>
+          </p:nvPr>
+        </p:nvSpPr>
+        <p:spPr/>
+        <p:txBody>
+          <a:bodyPr/>
+          <a:lstStyle/>
+          <a:p>
+            <a:r>
+              <a:rPr lang="en-US" dirty="0" smtClean="0"/>
+              <a:t>Where do we find libraries?</a:t>
+            </a:r>
+            <a:endParaRPr lang="en-US" dirty="0"/>
+          </a:p>
+        </p:txBody>
+      </p:sp>
+      <p:sp>
+        <p:nvSpPr>
+          <p:cNvPr id="3" name="Content Placeholder 2"/>
+          <p:cNvSpPr>
+            <a:spLocks noGrp="1"/>
+          </p:cNvSpPr>
+          <p:nvPr>
+            <p:ph sz="quarter" idx="10"/>
+          </p:nvPr>
+        </p:nvSpPr>
+        <p:spPr/>
+        <p:txBody>
+          <a:bodyPr/>
+          <a:lstStyle/>
+          <a:p>
+            <a:r>
+              <a:rPr lang="en-US" dirty="0" err="1" smtClean="0"/>
+              <a:t>MicroJS</a:t>
+            </a:r>
+            <a:r>
+              <a:rPr lang="en-US" dirty="0" smtClean="0"/>
+              <a:t> is a great starting point</a:t>
+            </a:r>
+          </a:p>
+          <a:p>
+            <a:pPr lvl="1"/>
+            <a:r>
+              <a:rPr lang="en-US" dirty="0" smtClean="0"/>
+              <a:t>Simple collection of JavaScript libraries that do little things</a:t>
+            </a:r>
+            <a:endParaRPr lang="en-US" dirty="0"/>
+          </a:p>
+        </p:txBody>
+      </p:sp>
+    </p:spTree>
+    <p:extLst>
+      <p:ext uri="{BB962C8B-B14F-4D97-AF65-F5344CB8AC3E}">
+        <p14:creationId xmlns:p14="http://schemas.microsoft.com/office/powerpoint/2010/main" val="722342107"/>
+      </p:ext>
+    </p:extLst>
+  </p:cSld>
+  <p:clrMapOvr>
+    <a:masterClrMapping/>
+  </p:clrMapOvr>
 </p:sld>
 </file>
 
@@ -16484,14 +16606,14 @@
                 <a:gridCol w="5762625">
                   <a:extLst>
                     <a:ext uri="{9D8B030D-6E8A-4147-A177-3AD203B41FA5}">
-                      <a16:colId xmlns:a16="http://schemas.microsoft.com/office/drawing/2014/main" val="20000"/>
+                      <a16:colId xmlns:a16="http://schemas.microsoft.com/office/drawing/2014/main" xmlns="" val="20000"/>
                     </a:ext>
                   </a:extLst>
                 </a:gridCol>
                 <a:gridCol w="5762625">
                   <a:extLst>
                     <a:ext uri="{9D8B030D-6E8A-4147-A177-3AD203B41FA5}">
-                      <a16:colId xmlns:a16="http://schemas.microsoft.com/office/drawing/2014/main" val="20001"/>
+                      <a16:colId xmlns:a16="http://schemas.microsoft.com/office/drawing/2014/main" xmlns="" val="20001"/>
                     </a:ext>
                   </a:extLst>
                 </a:gridCol>
@@ -16529,7 +16651,7 @@
                 </a:tc>
                 <a:extLst>
                   <a:ext uri="{0D108BD9-81ED-4DB2-BD59-A6C34878D82A}">
-                    <a16:rowId xmlns:a16="http://schemas.microsoft.com/office/drawing/2014/main" val="10000"/>
+                    <a16:rowId xmlns:a16="http://schemas.microsoft.com/office/drawing/2014/main" xmlns="" val="10000"/>
                   </a:ext>
                 </a:extLst>
               </a:tr>
@@ -16594,7 +16716,7 @@
                 </a:tc>
                 <a:extLst>
                   <a:ext uri="{0D108BD9-81ED-4DB2-BD59-A6C34878D82A}">
-                    <a16:rowId xmlns:a16="http://schemas.microsoft.com/office/drawing/2014/main" val="10001"/>
+                    <a16:rowId xmlns:a16="http://schemas.microsoft.com/office/drawing/2014/main" xmlns="" val="10001"/>
                   </a:ext>
                 </a:extLst>
               </a:tr>
@@ -16616,21 +16738,7 @@
                           <a:latin typeface="Segoe UI Light" panose="020B0502040204020203" pitchFamily="34" charset="0"/>
                           <a:cs typeface="Segoe UI Light" panose="020B0502040204020203" pitchFamily="34" charset="0"/>
                         </a:rPr>
-                        <a:t>Object </a:t>
-                      </a:r>
-                      <a:r>
-                        <a:rPr lang="en-US" sz="2400" baseline="0" dirty="0" smtClean="0">
-                          <a:latin typeface="Segoe UI Light" panose="020B0502040204020203" pitchFamily="34" charset="0"/>
-                          <a:cs typeface="Segoe UI Light" panose="020B0502040204020203" pitchFamily="34" charset="0"/>
-                        </a:rPr>
-                        <a:t>Oriented </a:t>
-                      </a:r>
-                      <a:r>
-                        <a:rPr lang="en-US" sz="2400" baseline="0" dirty="0" smtClean="0">
-                          <a:latin typeface="Segoe UI Light" panose="020B0502040204020203" pitchFamily="34" charset="0"/>
-                          <a:cs typeface="Segoe UI Light" panose="020B0502040204020203" pitchFamily="34" charset="0"/>
-                        </a:rPr>
-                        <a:t>Programming </a:t>
+                        <a:t>Object Oriented Programming </a:t>
                       </a:r>
                       <a:endParaRPr lang="en-US" sz="2400" dirty="0">
                         <a:latin typeface="Segoe UI Light" panose="020B0502040204020203" pitchFamily="34" charset="0"/>
@@ -16677,7 +16785,7 @@
                 </a:tc>
                 <a:extLst>
                   <a:ext uri="{0D108BD9-81ED-4DB2-BD59-A6C34878D82A}">
-                    <a16:rowId xmlns:a16="http://schemas.microsoft.com/office/drawing/2014/main" val="10002"/>
+                    <a16:rowId xmlns:a16="http://schemas.microsoft.com/office/drawing/2014/main" xmlns="" val="10002"/>
                   </a:ext>
                 </a:extLst>
               </a:tr>
@@ -16741,7 +16849,7 @@
                 </a:tc>
                 <a:extLst>
                   <a:ext uri="{0D108BD9-81ED-4DB2-BD59-A6C34878D82A}">
-                    <a16:rowId xmlns:a16="http://schemas.microsoft.com/office/drawing/2014/main" val="10003"/>
+                    <a16:rowId xmlns:a16="http://schemas.microsoft.com/office/drawing/2014/main" xmlns="" val="10003"/>
                   </a:ext>
                 </a:extLst>
               </a:tr>
@@ -16852,6 +16960,454 @@
 </p:sld>
 </file>
 
+<file path=ppt/slides/slide20.xml><?xml version="1.0" encoding="utf-8"?>
+<p:sld xmlns:a="http://schemas.openxmlformats.org/drawingml/2006/main" xmlns:r="http://schemas.openxmlformats.org/officeDocument/2006/relationships" xmlns:p="http://schemas.openxmlformats.org/presentationml/2006/main">
+  <p:cSld>
+    <p:spTree>
+      <p:nvGrpSpPr>
+        <p:cNvPr id="1" name=""/>
+        <p:cNvGrpSpPr/>
+        <p:nvPr/>
+      </p:nvGrpSpPr>
+      <p:grpSpPr>
+        <a:xfrm>
+          <a:off x="0" y="0"/>
+          <a:ext cx="0" cy="0"/>
+          <a:chOff x="0" y="0"/>
+          <a:chExt cx="0" cy="0"/>
+        </a:xfrm>
+      </p:grpSpPr>
+      <p:sp>
+        <p:nvSpPr>
+          <p:cNvPr id="2" name="Title 1"/>
+          <p:cNvSpPr>
+            <a:spLocks noGrp="1"/>
+          </p:cNvSpPr>
+          <p:nvPr>
+            <p:ph type="title"/>
+          </p:nvPr>
+        </p:nvSpPr>
+        <p:spPr/>
+        <p:txBody>
+          <a:bodyPr/>
+          <a:lstStyle/>
+          <a:p>
+            <a:r>
+              <a:rPr lang="en-US" dirty="0" smtClean="0"/>
+              <a:t>What is MVVM</a:t>
+            </a:r>
+            <a:endParaRPr lang="en-US" dirty="0"/>
+          </a:p>
+        </p:txBody>
+      </p:sp>
+      <p:sp>
+        <p:nvSpPr>
+          <p:cNvPr id="3" name="Content Placeholder 2"/>
+          <p:cNvSpPr>
+            <a:spLocks noGrp="1"/>
+          </p:cNvSpPr>
+          <p:nvPr>
+            <p:ph sz="quarter" idx="10"/>
+          </p:nvPr>
+        </p:nvSpPr>
+        <p:spPr/>
+        <p:txBody>
+          <a:bodyPr/>
+          <a:lstStyle/>
+          <a:p>
+            <a:r>
+              <a:rPr lang="en-US" dirty="0" smtClean="0"/>
+              <a:t>Model-View-</a:t>
+            </a:r>
+            <a:r>
+              <a:rPr lang="en-US" dirty="0" err="1" smtClean="0"/>
+              <a:t>ViewModel</a:t>
+            </a:r>
+            <a:endParaRPr lang="en-US" dirty="0" smtClean="0"/>
+          </a:p>
+          <a:p>
+            <a:r>
+              <a:rPr lang="en-US" dirty="0" smtClean="0"/>
+              <a:t>A framework for automatically updating a UI</a:t>
+            </a:r>
+          </a:p>
+          <a:p>
+            <a:r>
+              <a:rPr lang="en-US" dirty="0" smtClean="0"/>
+              <a:t>Several are available</a:t>
+            </a:r>
+          </a:p>
+          <a:p>
+            <a:pPr lvl="1"/>
+            <a:r>
+              <a:rPr lang="en-US" dirty="0" smtClean="0"/>
+              <a:t>Knockout</a:t>
+            </a:r>
+          </a:p>
+          <a:p>
+            <a:pPr lvl="1"/>
+            <a:r>
+              <a:rPr lang="en-US" dirty="0" smtClean="0"/>
+              <a:t>Angular</a:t>
+            </a:r>
+          </a:p>
+          <a:p>
+            <a:pPr lvl="1"/>
+            <a:r>
+              <a:rPr lang="en-US" dirty="0" smtClean="0"/>
+              <a:t>Ember</a:t>
+            </a:r>
+          </a:p>
+          <a:p>
+            <a:pPr lvl="1"/>
+            <a:r>
+              <a:rPr lang="en-US" dirty="0" smtClean="0"/>
+              <a:t>Backbone</a:t>
+            </a:r>
+            <a:endParaRPr lang="en-US" dirty="0"/>
+          </a:p>
+        </p:txBody>
+      </p:sp>
+    </p:spTree>
+    <p:extLst>
+      <p:ext uri="{BB962C8B-B14F-4D97-AF65-F5344CB8AC3E}">
+        <p14:creationId xmlns:p14="http://schemas.microsoft.com/office/powerpoint/2010/main" val="2917800827"/>
+      </p:ext>
+    </p:extLst>
+  </p:cSld>
+  <p:clrMapOvr>
+    <a:masterClrMapping/>
+  </p:clrMapOvr>
+</p:sld>
+</file>
+
+<file path=ppt/slides/slide21.xml><?xml version="1.0" encoding="utf-8"?>
+<p:sld xmlns:a="http://schemas.openxmlformats.org/drawingml/2006/main" xmlns:r="http://schemas.openxmlformats.org/officeDocument/2006/relationships" xmlns:p="http://schemas.openxmlformats.org/presentationml/2006/main">
+  <p:cSld>
+    <p:spTree>
+      <p:nvGrpSpPr>
+        <p:cNvPr id="1" name=""/>
+        <p:cNvGrpSpPr/>
+        <p:nvPr/>
+      </p:nvGrpSpPr>
+      <p:grpSpPr>
+        <a:xfrm>
+          <a:off x="0" y="0"/>
+          <a:ext cx="0" cy="0"/>
+          <a:chOff x="0" y="0"/>
+          <a:chExt cx="0" cy="0"/>
+        </a:xfrm>
+      </p:grpSpPr>
+      <p:sp>
+        <p:nvSpPr>
+          <p:cNvPr id="2" name="Title 1"/>
+          <p:cNvSpPr>
+            <a:spLocks noGrp="1"/>
+          </p:cNvSpPr>
+          <p:nvPr>
+            <p:ph type="title"/>
+          </p:nvPr>
+        </p:nvSpPr>
+        <p:spPr/>
+        <p:txBody>
+          <a:bodyPr/>
+          <a:lstStyle/>
+          <a:p>
+            <a:r>
+              <a:rPr lang="en-US" dirty="0" smtClean="0"/>
+              <a:t>Which one should I learn?</a:t>
+            </a:r>
+            <a:endParaRPr lang="en-US" dirty="0"/>
+          </a:p>
+        </p:txBody>
+      </p:sp>
+      <p:sp>
+        <p:nvSpPr>
+          <p:cNvPr id="3" name="Content Placeholder 2"/>
+          <p:cNvSpPr>
+            <a:spLocks noGrp="1"/>
+          </p:cNvSpPr>
+          <p:nvPr>
+            <p:ph sz="quarter" idx="10"/>
+          </p:nvPr>
+        </p:nvSpPr>
+        <p:spPr/>
+        <p:txBody>
+          <a:bodyPr/>
+          <a:lstStyle/>
+          <a:p>
+            <a:r>
+              <a:rPr lang="en-US" dirty="0" smtClean="0"/>
+              <a:t>All of them</a:t>
+            </a:r>
+          </a:p>
+          <a:p>
+            <a:pPr lvl="1"/>
+            <a:r>
+              <a:rPr lang="en-US" dirty="0" smtClean="0"/>
+              <a:t>Or at least be familiar with several of them</a:t>
+            </a:r>
+          </a:p>
+          <a:p>
+            <a:r>
+              <a:rPr lang="en-US" dirty="0" smtClean="0"/>
+              <a:t>They all have their strengths and weaknesses</a:t>
+            </a:r>
+          </a:p>
+          <a:p>
+            <a:r>
+              <a:rPr lang="en-US" dirty="0" smtClean="0"/>
+              <a:t>Sometimes it comes down to personal preference</a:t>
+            </a:r>
+          </a:p>
+          <a:p>
+            <a:r>
+              <a:rPr lang="en-US" dirty="0" smtClean="0"/>
+              <a:t>Different teams use different solutions</a:t>
+            </a:r>
+            <a:endParaRPr lang="en-US" dirty="0"/>
+          </a:p>
+        </p:txBody>
+      </p:sp>
+    </p:spTree>
+    <p:extLst>
+      <p:ext uri="{BB962C8B-B14F-4D97-AF65-F5344CB8AC3E}">
+        <p14:creationId xmlns:p14="http://schemas.microsoft.com/office/powerpoint/2010/main" val="3884893762"/>
+      </p:ext>
+    </p:extLst>
+  </p:cSld>
+  <p:clrMapOvr>
+    <a:masterClrMapping/>
+  </p:clrMapOvr>
+</p:sld>
+</file>
+
+<file path=ppt/slides/slide22.xml><?xml version="1.0" encoding="utf-8"?>
+<p:sld xmlns:a="http://schemas.openxmlformats.org/drawingml/2006/main" xmlns:r="http://schemas.openxmlformats.org/officeDocument/2006/relationships" xmlns:p="http://schemas.openxmlformats.org/presentationml/2006/main">
+  <p:cSld>
+    <p:spTree>
+      <p:nvGrpSpPr>
+        <p:cNvPr id="1" name=""/>
+        <p:cNvGrpSpPr/>
+        <p:nvPr/>
+      </p:nvGrpSpPr>
+      <p:grpSpPr>
+        <a:xfrm>
+          <a:off x="0" y="0"/>
+          <a:ext cx="0" cy="0"/>
+          <a:chOff x="0" y="0"/>
+          <a:chExt cx="0" cy="0"/>
+        </a:xfrm>
+      </p:grpSpPr>
+      <p:sp>
+        <p:nvSpPr>
+          <p:cNvPr id="2" name="Title 1"/>
+          <p:cNvSpPr>
+            <a:spLocks noGrp="1"/>
+          </p:cNvSpPr>
+          <p:nvPr>
+            <p:ph type="title"/>
+          </p:nvPr>
+        </p:nvSpPr>
+        <p:spPr/>
+        <p:txBody>
+          <a:bodyPr/>
+          <a:lstStyle/>
+          <a:p>
+            <a:r>
+              <a:rPr lang="en-US" dirty="0" smtClean="0"/>
+              <a:t>Where do we go from here?</a:t>
+            </a:r>
+            <a:endParaRPr lang="en-US" dirty="0"/>
+          </a:p>
+        </p:txBody>
+      </p:sp>
+      <p:sp>
+        <p:nvSpPr>
+          <p:cNvPr id="3" name="Content Placeholder 2"/>
+          <p:cNvSpPr>
+            <a:spLocks noGrp="1"/>
+          </p:cNvSpPr>
+          <p:nvPr>
+            <p:ph sz="quarter" idx="10"/>
+          </p:nvPr>
+        </p:nvSpPr>
+        <p:spPr/>
+        <p:txBody>
+          <a:bodyPr/>
+          <a:lstStyle/>
+          <a:p>
+            <a:r>
+              <a:rPr lang="en-US" dirty="0" smtClean="0"/>
+              <a:t>Check out jQuery!</a:t>
+            </a:r>
+          </a:p>
+          <a:p>
+            <a:r>
+              <a:rPr lang="en-US" dirty="0" smtClean="0"/>
+              <a:t>Check out a couple of MVVM frameworks</a:t>
+            </a:r>
+          </a:p>
+          <a:p>
+            <a:r>
+              <a:rPr lang="en-US" smtClean="0"/>
+              <a:t>Keep practicing!</a:t>
+            </a:r>
+            <a:endParaRPr lang="en-US"/>
+          </a:p>
+        </p:txBody>
+      </p:sp>
+    </p:spTree>
+    <p:extLst>
+      <p:ext uri="{BB962C8B-B14F-4D97-AF65-F5344CB8AC3E}">
+        <p14:creationId xmlns:p14="http://schemas.microsoft.com/office/powerpoint/2010/main" val="442194628"/>
+      </p:ext>
+    </p:extLst>
+  </p:cSld>
+  <p:clrMapOvr>
+    <a:masterClrMapping/>
+  </p:clrMapOvr>
+</p:sld>
+</file>
+
+<file path=ppt/slides/slide23.xml><?xml version="1.0" encoding="utf-8"?>
+<p:sld xmlns:a="http://schemas.openxmlformats.org/drawingml/2006/main" xmlns:r="http://schemas.openxmlformats.org/officeDocument/2006/relationships" xmlns:p="http://schemas.openxmlformats.org/presentationml/2006/main">
+  <p:cSld>
+    <p:spTree>
+      <p:nvGrpSpPr>
+        <p:cNvPr id="1" name=""/>
+        <p:cNvGrpSpPr/>
+        <p:nvPr/>
+      </p:nvGrpSpPr>
+      <p:grpSpPr>
+        <a:xfrm>
+          <a:off x="0" y="0"/>
+          <a:ext cx="0" cy="0"/>
+          <a:chOff x="0" y="0"/>
+          <a:chExt cx="0" cy="0"/>
+        </a:xfrm>
+      </p:grpSpPr>
+      <p:sp>
+        <p:nvSpPr>
+          <p:cNvPr id="2" name="Title 1"/>
+          <p:cNvSpPr>
+            <a:spLocks noGrp="1"/>
+          </p:cNvSpPr>
+          <p:nvPr>
+            <p:ph type="title"/>
+          </p:nvPr>
+        </p:nvSpPr>
+        <p:spPr/>
+        <p:txBody>
+          <a:bodyPr/>
+          <a:lstStyle/>
+          <a:p>
+            <a:r>
+              <a:rPr lang="en-US" dirty="0" smtClean="0"/>
+              <a:t>Summary</a:t>
+            </a:r>
+            <a:endParaRPr lang="en-US" dirty="0"/>
+          </a:p>
+        </p:txBody>
+      </p:sp>
+      <p:sp>
+        <p:nvSpPr>
+          <p:cNvPr id="7" name="Content Placeholder 6"/>
+          <p:cNvSpPr>
+            <a:spLocks noGrp="1"/>
+          </p:cNvSpPr>
+          <p:nvPr>
+            <p:ph sz="quarter" idx="10"/>
+          </p:nvPr>
+        </p:nvSpPr>
+        <p:spPr/>
+        <p:txBody>
+          <a:bodyPr>
+            <a:normAutofit/>
+          </a:bodyPr>
+          <a:lstStyle/>
+          <a:p>
+            <a:pPr fontAlgn="ctr"/>
+            <a:r>
+              <a:rPr lang="en-US" dirty="0"/>
+              <a:t>jQuery</a:t>
+            </a:r>
+          </a:p>
+          <a:p>
+            <a:pPr fontAlgn="ctr"/>
+            <a:r>
+              <a:rPr lang="en-US" dirty="0" err="1"/>
+              <a:t>RequireJS</a:t>
+            </a:r>
+            <a:endParaRPr lang="en-US" dirty="0"/>
+          </a:p>
+          <a:p>
+            <a:pPr fontAlgn="ctr"/>
+            <a:r>
+              <a:rPr lang="en-US" dirty="0" err="1"/>
+              <a:t>Microjs</a:t>
+            </a:r>
+            <a:endParaRPr lang="en-US" dirty="0"/>
+          </a:p>
+        </p:txBody>
+      </p:sp>
+    </p:spTree>
+    <p:extLst>
+      <p:ext uri="{BB962C8B-B14F-4D97-AF65-F5344CB8AC3E}">
+        <p14:creationId xmlns:p14="http://schemas.microsoft.com/office/powerpoint/2010/main" val="934332795"/>
+      </p:ext>
+    </p:extLst>
+  </p:cSld>
+  <p:clrMapOvr>
+    <a:masterClrMapping/>
+  </p:clrMapOvr>
+  <p:timing>
+    <p:tnLst>
+      <p:par>
+        <p:cTn id="1" dur="indefinite" restart="never" nodeType="tmRoot"/>
+      </p:par>
+    </p:tnLst>
+  </p:timing>
+</p:sld>
+</file>
+
+<file path=ppt/slides/slide24.xml><?xml version="1.0" encoding="utf-8"?>
+<p:sld xmlns:a="http://schemas.openxmlformats.org/drawingml/2006/main" xmlns:r="http://schemas.openxmlformats.org/officeDocument/2006/relationships" xmlns:p="http://schemas.openxmlformats.org/presentationml/2006/main">
+  <p:cSld>
+    <p:spTree>
+      <p:nvGrpSpPr>
+        <p:cNvPr id="1" name=""/>
+        <p:cNvGrpSpPr/>
+        <p:nvPr/>
+      </p:nvGrpSpPr>
+      <p:grpSpPr>
+        <a:xfrm>
+          <a:off x="0" y="0"/>
+          <a:ext cx="0" cy="0"/>
+          <a:chOff x="0" y="0"/>
+          <a:chExt cx="0" cy="0"/>
+        </a:xfrm>
+      </p:grpSpPr>
+    </p:spTree>
+    <p:extLst>
+      <p:ext uri="{BB962C8B-B14F-4D97-AF65-F5344CB8AC3E}">
+        <p14:creationId xmlns:p14="http://schemas.microsoft.com/office/powerpoint/2010/main" val="898363405"/>
+      </p:ext>
+    </p:extLst>
+  </p:cSld>
+  <p:clrMapOvr>
+    <a:masterClrMapping/>
+  </p:clrMapOvr>
+  <p:timing>
+    <p:tnLst>
+      <p:par>
+        <p:cTn id="1" dur="indefinite" restart="never" nodeType="tmRoot"/>
+      </p:par>
+    </p:tnLst>
+  </p:timing>
+</p:sld>
+</file>
+
 <file path=ppt/slides/slide3.xml><?xml version="1.0" encoding="utf-8"?>
 <p:sld xmlns:a="http://schemas.openxmlformats.org/drawingml/2006/main" xmlns:r="http://schemas.openxmlformats.org/officeDocument/2006/relationships" xmlns:p="http://schemas.openxmlformats.org/presentationml/2006/main">
   <p:cSld>
@@ -16926,8 +17482,8 @@
           <a:p>
             <a:pPr fontAlgn="ctr"/>
             <a:r>
-              <a:rPr lang="en-US" dirty="0" err="1" smtClean="0"/>
-              <a:t>Microjs</a:t>
+              <a:rPr lang="en-US" dirty="0" smtClean="0"/>
+              <a:t>Other libraries</a:t>
             </a:r>
             <a:endParaRPr lang="en-US" dirty="0" smtClean="0"/>
           </a:p>
@@ -17630,11 +18186,7 @@
             </a:r>
             <a:r>
               <a:rPr lang="en-US" dirty="0" smtClean="0"/>
-              <a:t>).</a:t>
-            </a:r>
-            <a:r>
-              <a:rPr lang="en-US" dirty="0" smtClean="0"/>
-              <a:t>hide();</a:t>
+              <a:t>).hide();</a:t>
             </a:r>
           </a:p>
           <a:p>
@@ -17643,11 +18195,7 @@
           <a:p>
             <a:r>
               <a:rPr lang="en-US" dirty="0" smtClean="0"/>
-              <a:t>	</a:t>
-            </a:r>
-            <a:r>
-              <a:rPr lang="en-US" dirty="0" smtClean="0"/>
-              <a:t>$(</a:t>
+              <a:t>	$(</a:t>
             </a:r>
             <a:r>
               <a:rPr lang="en-US" dirty="0">
@@ -17659,11 +18207,7 @@
             </a:r>
             <a:r>
               <a:rPr lang="en-US" dirty="0" smtClean="0"/>
-              <a:t>).</a:t>
-            </a:r>
-            <a:r>
-              <a:rPr lang="en-US" dirty="0" smtClean="0"/>
-              <a:t>hide();</a:t>
+              <a:t>).hide();</a:t>
             </a:r>
           </a:p>
           <a:p>
@@ -18796,6 +19340,15 @@
 </file>
 
 <file path=customXml/item1.xml><?xml version="1.0" encoding="utf-8"?>
+<?mso-contentType ?>
+<FormTemplates xmlns="http://schemas.microsoft.com/sharepoint/v3/contenttype/forms">
+  <Display>DocumentLibraryForm</Display>
+  <Edit>DocumentLibraryForm</Edit>
+  <New>DocumentLibraryForm</New>
+</FormTemplates>
+</file>
+
+<file path=customXml/item2.xml><?xml version="1.0" encoding="utf-8"?>
 <ct:contentTypeSchema xmlns:ct="http://schemas.microsoft.com/office/2006/metadata/contentType" xmlns:ma="http://schemas.microsoft.com/office/2006/metadata/properties/metaAttributes" ct:_="" ma:_="" ma:contentTypeName="Document" ma:contentTypeID="0x010100BD9BF63586D9884E9335F37127EABBE8" ma:contentTypeVersion="1" ma:contentTypeDescription="Create a new document." ma:contentTypeScope="" ma:versionID="3b40c7f62b06f9f0cd473a069af3a91f">
   <xsd:schema xmlns:xsd="http://www.w3.org/2001/XMLSchema" xmlns:xs="http://www.w3.org/2001/XMLSchema" xmlns:p="http://schemas.microsoft.com/office/2006/metadata/properties" xmlns:ns3="e5a13ba8-98e3-4f23-a221-7ac9824aa662" targetNamespace="http://schemas.microsoft.com/office/2006/metadata/properties" ma:root="true" ma:fieldsID="4327d685be69599737fa0038b3ab671f" ns3:_="">
     <xsd:import namespace="e5a13ba8-98e3-4f23-a221-7ac9824aa662"/>
@@ -18935,15 +19488,6 @@
 </ct:contentTypeSchema>
 </file>
 
-<file path=customXml/item2.xml><?xml version="1.0" encoding="utf-8"?>
-<?mso-contentType ?>
-<FormTemplates xmlns="http://schemas.microsoft.com/sharepoint/v3/contenttype/forms">
-  <Display>DocumentLibraryForm</Display>
-  <Edit>DocumentLibraryForm</Edit>
-  <New>DocumentLibraryForm</New>
-</FormTemplates>
-</file>
-
 <file path=customXml/item3.xml><?xml version="1.0" encoding="utf-8"?>
 <p:properties xmlns:p="http://schemas.microsoft.com/office/2006/metadata/properties" xmlns:xsi="http://www.w3.org/2001/XMLSchema-instance" xmlns:pc="http://schemas.microsoft.com/office/infopath/2007/PartnerControls">
   <documentManagement/>
@@ -18951,6 +19495,14 @@
 </file>
 
 <file path=customXml/itemProps1.xml><?xml version="1.0" encoding="utf-8"?>
+<ds:datastoreItem xmlns:ds="http://schemas.openxmlformats.org/officeDocument/2006/customXml" ds:itemID="{B0CA13EC-1D3C-4D6F-8D1C-E8A452CFC79A}">
+  <ds:schemaRefs>
+    <ds:schemaRef ds:uri="http://schemas.microsoft.com/sharepoint/v3/contenttype/forms"/>
+  </ds:schemaRefs>
+</ds:datastoreItem>
+</file>
+
+<file path=customXml/itemProps2.xml><?xml version="1.0" encoding="utf-8"?>
 <ds:datastoreItem xmlns:ds="http://schemas.openxmlformats.org/officeDocument/2006/customXml" ds:itemID="{DABDB566-B5C0-42A7-A33C-2648D176B99D}">
   <ds:schemaRefs>
     <ds:schemaRef ds:uri="http://schemas.microsoft.com/office/2006/metadata/contentType"/>
@@ -18964,14 +19516,6 @@
     <ds:schemaRef ds:uri="http://purl.org/dc/elements/1.1/"/>
     <ds:schemaRef ds:uri="http://purl.org/dc/terms/"/>
     <ds:schemaRef ds:uri="http://schemas.microsoft.com/internal/obd"/>
-  </ds:schemaRefs>
-</ds:datastoreItem>
-</file>
-
-<file path=customXml/itemProps2.xml><?xml version="1.0" encoding="utf-8"?>
-<ds:datastoreItem xmlns:ds="http://schemas.openxmlformats.org/officeDocument/2006/customXml" ds:itemID="{B0CA13EC-1D3C-4D6F-8D1C-E8A452CFC79A}">
-  <ds:schemaRefs>
-    <ds:schemaRef ds:uri="http://schemas.microsoft.com/sharepoint/v3/contenttype/forms"/>
   </ds:schemaRefs>
 </ds:datastoreItem>
 </file>

</xml_diff>